<commit_message>
Minor Edits on some file
</commit_message>
<xml_diff>
--- a/Insights and Analytics/USA - Federal Employee Viewpoint Survey - EDA/Presentation/Data Storytelling Presentation - Marcus Morante.pptx
+++ b/Insights and Analytics/USA - Federal Employee Viewpoint Survey - EDA/Presentation/Data Storytelling Presentation - Marcus Morante.pptx
@@ -46202,7 +46202,27 @@
                   </a:schemeClr>
                 </a:solidFill>
               </a:rPr>
-              <a:t> (somehow) as across all Organization, 69% of them have half of their employee population took the survey which means it is not indicative of the voice of the entire workforce</a:t>
+              <a:t> as across all Organization, 69% of the </a:t>
+            </a:r>
+            <a:r>
+              <a:rPr lang="en-US">
+                <a:solidFill>
+                  <a:schemeClr val="accent6">
+                    <a:lumMod val="10000"/>
+                  </a:schemeClr>
+                </a:solidFill>
+              </a:rPr>
+              <a:t>employee population </a:t>
+            </a:r>
+            <a:r>
+              <a:rPr lang="en-US" dirty="0">
+                <a:solidFill>
+                  <a:schemeClr val="accent6">
+                    <a:lumMod val="10000"/>
+                  </a:schemeClr>
+                </a:solidFill>
+              </a:rPr>
+              <a:t>took the survey which means it is not indicative of the voice of the entire workforce</a:t>
             </a:r>
           </a:p>
         </p:txBody>

</xml_diff>